<commit_message>
Update 2. Modelamiento & Optimización.pptx
</commit_message>
<xml_diff>
--- a/1. Lectures/Introducción a la Optimización aplicada a Sistemas de Energía Eléctrica/Dia 1/2. Modelamiento & Optimización.pptx
+++ b/1. Lectures/Introducción a la Optimización aplicada a Sistemas de Energía Eléctrica/Dia 1/2. Modelamiento & Optimización.pptx
@@ -5,10 +5,10 @@
     <p:sldMasterId id="2147483732" r:id="rId1"/>
   </p:sldMasterIdLst>
   <p:notesMasterIdLst>
-    <p:notesMasterId r:id="rId8"/>
+    <p:notesMasterId r:id="rId10"/>
   </p:notesMasterIdLst>
   <p:handoutMasterIdLst>
-    <p:handoutMasterId r:id="rId9"/>
+    <p:handoutMasterId r:id="rId11"/>
   </p:handoutMasterIdLst>
   <p:sldIdLst>
     <p:sldId id="256" r:id="rId2"/>
@@ -16,7 +16,9 @@
     <p:sldId id="394" r:id="rId4"/>
     <p:sldId id="397" r:id="rId5"/>
     <p:sldId id="396" r:id="rId6"/>
-    <p:sldId id="395" r:id="rId7"/>
+    <p:sldId id="399" r:id="rId7"/>
+    <p:sldId id="395" r:id="rId8"/>
+    <p:sldId id="398" r:id="rId9"/>
   </p:sldIdLst>
   <p:sldSz cx="9144000" cy="6858000" type="screen4x3"/>
   <p:notesSz cx="6858000" cy="9144000"/>
@@ -125,7 +127,9 @@
             <p14:sldId id="394"/>
             <p14:sldId id="397"/>
             <p14:sldId id="396"/>
+            <p14:sldId id="399"/>
             <p14:sldId id="395"/>
+            <p14:sldId id="398"/>
           </p14:sldIdLst>
         </p14:section>
       </p14:sectionLst>
@@ -4152,7 +4156,7 @@
           </a:bodyPr>
           <a:lstStyle>
             <a:lvl1pPr algn="ctr" eaLnBrk="1" latinLnBrk="0" hangingPunct="1">
-              <a:defRPr kumimoji="0" sz="1050">
+              <a:defRPr kumimoji="0" sz="1400">
                 <a:solidFill>
                   <a:sysClr val="windowText" lastClr="000000"/>
                 </a:solidFill>
@@ -4324,6 +4328,36 @@
             <a:ext cx="704761" cy="576064"/>
           </a:xfrm>
           <a:prstGeom prst="ellipse">
+            <a:avLst/>
+          </a:prstGeom>
+        </p:spPr>
+      </p:pic>
+      <p:pic>
+        <p:nvPicPr>
+          <p:cNvPr id="3" name="Imagen 2"/>
+          <p:cNvPicPr>
+            <a:picLocks noChangeAspect="1"/>
+          </p:cNvPicPr>
+          <p:nvPr userDrawn="1"/>
+        </p:nvPicPr>
+        <p:blipFill>
+          <a:blip r:embed="rId15" cstate="print">
+            <a:extLst>
+              <a:ext uri="{28A0092B-C50C-407E-A947-70E740481C1C}">
+                <a14:useLocalDpi xmlns:a14="http://schemas.microsoft.com/office/drawing/2010/main" val="0"/>
+              </a:ext>
+            </a:extLst>
+          </a:blip>
+          <a:stretch>
+            <a:fillRect/>
+          </a:stretch>
+        </p:blipFill>
+        <p:spPr>
+          <a:xfrm>
+            <a:off x="8390077" y="6146157"/>
+            <a:ext cx="582303" cy="539229"/>
+          </a:xfrm>
+          <a:prstGeom prst="rect">
             <a:avLst/>
           </a:prstGeom>
         </p:spPr>
@@ -5873,11 +5907,7 @@
             </a:pPr>
             <a:r>
               <a:rPr lang="es-MX" sz="2000" dirty="0"/>
-              <a:t>¿Cuántas sillas y mesas construyo con el fin de obtener la máxima </a:t>
-            </a:r>
-            <a:r>
-              <a:rPr lang="es-MX" sz="2000"/>
-              <a:t>utilidad por semana?  </a:t>
+              <a:t>¿Cuántas sillas y mesas construyo con el fin de obtener la máxima utilidad por semana?  </a:t>
             </a:r>
             <a:endParaRPr lang="es-PE" sz="2000" dirty="0"/>
           </a:p>
@@ -5993,8 +6023,8 @@
           </a:p>
         </p:txBody>
       </p:sp>
-      <mc:AlternateContent xmlns:mc="http://schemas.openxmlformats.org/markup-compatibility/2006">
-        <mc:Choice xmlns:a14="http://schemas.microsoft.com/office/drawing/2010/main" Requires="a14">
+      <mc:AlternateContent xmlns:mc="http://schemas.openxmlformats.org/markup-compatibility/2006" xmlns:a14="http://schemas.microsoft.com/office/drawing/2010/main">
+        <mc:Choice Requires="a14">
           <p:sp>
             <p:nvSpPr>
               <p:cNvPr id="5" name="CuadroTexto 4"/>
@@ -6081,7 +6111,7 @@
             </p:txBody>
           </p:sp>
         </mc:Choice>
-        <mc:Fallback>
+        <mc:Fallback xmlns="">
           <p:sp>
             <p:nvSpPr>
               <p:cNvPr id="5" name="CuadroTexto 4"/>
@@ -7276,7 +7306,7 @@
           <a:p>
             <a:r>
               <a:rPr lang="es-PE" altLang="en-US" dirty="0"/>
-              <a:t>Modelamiento matemático</a:t>
+              <a:t>Modelamiento matemático: Definición</a:t>
             </a:r>
           </a:p>
         </p:txBody>
@@ -7289,8 +7319,8 @@
         </p:nvSpPr>
         <p:spPr>
           <a:xfrm>
-            <a:off x="602191" y="836712"/>
-            <a:ext cx="8002257" cy="2246769"/>
+            <a:off x="602191" y="620688"/>
+            <a:ext cx="8002257" cy="3724096"/>
           </a:xfrm>
           <a:prstGeom prst="rect">
             <a:avLst/>
@@ -7303,27 +7333,34 @@
           </a:bodyPr>
           <a:lstStyle/>
           <a:p>
-            <a:pPr marL="285750" indent="-285750">
+            <a:pPr marL="285750" indent="-285750" algn="just">
               <a:buFont typeface="Arial" panose="020B0604020202020204" pitchFamily="34" charset="0"/>
               <a:buChar char="•"/>
             </a:pPr>
             <a:r>
+              <a:rPr lang="es-MX" sz="2400" dirty="0"/>
+              <a:t>Definición: </a:t>
+            </a:r>
+          </a:p>
+          <a:p>
+            <a:pPr lvl="1" algn="just"/>
+            <a:r>
               <a:rPr lang="es-MX" sz="2000" dirty="0"/>
-              <a:t>Definición: Proceso de abstracción de la realidad hacia formas matemáticas para representar partes de ella.</a:t>
-            </a:r>
-          </a:p>
-          <a:p>
-            <a:pPr marL="285750" indent="-285750">
+              <a:t>Proceso de abstracción de la realidad hacia formas matemáticas para representar partes de ella (como ejemplo, se tiene: la planificación de la política económica de un país). Este proceso es llevado a cabo para facilitar la comprensión y/o estudio de las características de dicha realidad.</a:t>
+            </a:r>
+          </a:p>
+          <a:p>
+            <a:pPr marL="285750" indent="-285750" algn="just">
               <a:buFont typeface="Arial" panose="020B0604020202020204" pitchFamily="34" charset="0"/>
               <a:buChar char="•"/>
             </a:pPr>
             <a:r>
-              <a:rPr lang="es-MX" sz="2000" dirty="0"/>
+              <a:rPr lang="es-MX" sz="2400" dirty="0"/>
               <a:t>Entonces: </a:t>
             </a:r>
           </a:p>
           <a:p>
-            <a:pPr marL="742950" lvl="1" indent="-285750">
+            <a:pPr marL="742950" lvl="1" indent="-285750" algn="just">
               <a:buFont typeface="Arial" panose="020B0604020202020204" pitchFamily="34" charset="0"/>
               <a:buChar char="•"/>
             </a:pPr>
@@ -7333,7 +7370,7 @@
             </a:r>
           </a:p>
           <a:p>
-            <a:pPr marL="742950" lvl="1" indent="-285750">
+            <a:pPr marL="742950" lvl="1" indent="-285750" algn="just">
               <a:buFont typeface="Arial" panose="020B0604020202020204" pitchFamily="34" charset="0"/>
               <a:buChar char="•"/>
             </a:pPr>
@@ -7343,800 +7380,41 @@
             </a:r>
           </a:p>
           <a:p>
-            <a:pPr marL="285750" indent="-285750">
+            <a:pPr marL="742950" lvl="1" indent="-285750" algn="just">
               <a:buFont typeface="Arial" panose="020B0604020202020204" pitchFamily="34" charset="0"/>
               <a:buChar char="•"/>
             </a:pPr>
             <a:r>
               <a:rPr lang="es-MX" sz="2000" dirty="0"/>
-              <a:t>Modelador: desarrollo del modelo.</a:t>
-            </a:r>
-          </a:p>
-          <a:p>
-            <a:pPr marL="285750" indent="-285750">
+              <a:t>Puede necesitar un equipo interdisciplinario</a:t>
+            </a:r>
+          </a:p>
+          <a:p>
+            <a:pPr marL="285750" indent="-285750" algn="just">
               <a:buFont typeface="Arial" panose="020B0604020202020204" pitchFamily="34" charset="0"/>
               <a:buChar char="•"/>
             </a:pPr>
             <a:r>
-              <a:rPr lang="es-MX" sz="2000" dirty="0"/>
-              <a:t>Experto: conocimiento de la realidad del problema</a:t>
-            </a:r>
-          </a:p>
-        </p:txBody>
-      </p:sp>
-      <p:sp>
-        <p:nvSpPr>
-          <p:cNvPr id="7" name="Rectángulo redondeado 6"/>
-          <p:cNvSpPr/>
-          <p:nvPr/>
-        </p:nvSpPr>
-        <p:spPr>
-          <a:xfrm>
-            <a:off x="971600" y="3389095"/>
-            <a:ext cx="1440160" cy="720080"/>
-          </a:xfrm>
-          <a:prstGeom prst="roundRect">
-            <a:avLst/>
-          </a:prstGeom>
-          <a:ln>
-            <a:solidFill>
-              <a:schemeClr val="tx2"/>
-            </a:solidFill>
-          </a:ln>
-        </p:spPr>
-        <p:style>
-          <a:lnRef idx="2">
-            <a:schemeClr val="accent1">
-              <a:shade val="50000"/>
-            </a:schemeClr>
-          </a:lnRef>
-          <a:fillRef idx="1">
-            <a:schemeClr val="accent1"/>
-          </a:fillRef>
-          <a:effectRef idx="0">
-            <a:schemeClr val="accent1"/>
-          </a:effectRef>
-          <a:fontRef idx="minor">
-            <a:schemeClr val="lt1"/>
-          </a:fontRef>
-        </p:style>
-        <p:txBody>
-          <a:bodyPr rtlCol="0" anchor="ctr"/>
-          <a:lstStyle/>
-          <a:p>
-            <a:pPr algn="ctr"/>
-            <a:r>
-              <a:rPr lang="es-MX" dirty="0"/>
-              <a:t>Realidad</a:t>
-            </a:r>
-            <a:endParaRPr lang="es-PE" dirty="0"/>
-          </a:p>
-        </p:txBody>
-      </p:sp>
-      <p:sp>
-        <p:nvSpPr>
-          <p:cNvPr id="6" name="Rectángulo redondeado 5"/>
-          <p:cNvSpPr/>
-          <p:nvPr/>
-        </p:nvSpPr>
-        <p:spPr>
-          <a:xfrm>
-            <a:off x="3851920" y="3425099"/>
-            <a:ext cx="1368152" cy="648072"/>
-          </a:xfrm>
-          <a:prstGeom prst="roundRect">
-            <a:avLst/>
-          </a:prstGeom>
-          <a:solidFill>
-            <a:schemeClr val="accent1"/>
-          </a:solidFill>
-          <a:ln>
-            <a:solidFill>
-              <a:schemeClr val="tx2"/>
-            </a:solidFill>
-          </a:ln>
-        </p:spPr>
-        <p:style>
-          <a:lnRef idx="2">
-            <a:schemeClr val="accent3">
-              <a:shade val="50000"/>
-            </a:schemeClr>
-          </a:lnRef>
-          <a:fillRef idx="1">
-            <a:schemeClr val="accent3"/>
-          </a:fillRef>
-          <a:effectRef idx="0">
-            <a:schemeClr val="accent3"/>
-          </a:effectRef>
-          <a:fontRef idx="minor">
-            <a:schemeClr val="lt1"/>
-          </a:fontRef>
-        </p:style>
-        <p:txBody>
-          <a:bodyPr rtlCol="0" anchor="ctr"/>
-          <a:lstStyle/>
-          <a:p>
-            <a:pPr algn="ctr"/>
-            <a:r>
-              <a:rPr lang="es-MX" dirty="0"/>
-              <a:t>Realidad asumida</a:t>
-            </a:r>
-            <a:endParaRPr lang="es-PE" dirty="0"/>
-          </a:p>
-        </p:txBody>
-      </p:sp>
-      <p:sp>
-        <p:nvSpPr>
-          <p:cNvPr id="8" name="Rectángulo redondeado 7"/>
-          <p:cNvSpPr/>
-          <p:nvPr/>
-        </p:nvSpPr>
-        <p:spPr>
-          <a:xfrm>
-            <a:off x="6660232" y="3425099"/>
-            <a:ext cx="1368152" cy="648072"/>
-          </a:xfrm>
-          <a:prstGeom prst="roundRect">
-            <a:avLst/>
-          </a:prstGeom>
-          <a:solidFill>
-            <a:schemeClr val="accent2">
-              <a:lumMod val="75000"/>
-            </a:schemeClr>
-          </a:solidFill>
-          <a:ln>
-            <a:solidFill>
-              <a:schemeClr val="accent2">
-                <a:lumMod val="50000"/>
-              </a:schemeClr>
-            </a:solidFill>
-          </a:ln>
-        </p:spPr>
-        <p:style>
-          <a:lnRef idx="2">
-            <a:schemeClr val="accent3">
-              <a:shade val="50000"/>
-            </a:schemeClr>
-          </a:lnRef>
-          <a:fillRef idx="1">
-            <a:schemeClr val="accent3"/>
-          </a:fillRef>
-          <a:effectRef idx="0">
-            <a:schemeClr val="accent3"/>
-          </a:effectRef>
-          <a:fontRef idx="minor">
-            <a:schemeClr val="lt1"/>
-          </a:fontRef>
-        </p:style>
-        <p:txBody>
-          <a:bodyPr rtlCol="0" anchor="ctr"/>
-          <a:lstStyle/>
-          <a:p>
-            <a:pPr algn="ctr"/>
-            <a:r>
-              <a:rPr lang="es-MX" dirty="0"/>
-              <a:t>Modelo</a:t>
-            </a:r>
-            <a:endParaRPr lang="es-PE" dirty="0"/>
-          </a:p>
-        </p:txBody>
-      </p:sp>
-      <p:sp>
-        <p:nvSpPr>
-          <p:cNvPr id="9" name="Rectángulo redondeado 8"/>
-          <p:cNvSpPr/>
-          <p:nvPr/>
-        </p:nvSpPr>
-        <p:spPr>
-          <a:xfrm>
-            <a:off x="971600" y="5085184"/>
-            <a:ext cx="1440160" cy="720080"/>
-          </a:xfrm>
-          <a:prstGeom prst="roundRect">
-            <a:avLst/>
-          </a:prstGeom>
-          <a:solidFill>
-            <a:schemeClr val="bg2">
-              <a:lumMod val="50000"/>
-            </a:schemeClr>
-          </a:solidFill>
-          <a:ln>
-            <a:solidFill>
-              <a:schemeClr val="bg2">
-                <a:lumMod val="10000"/>
-              </a:schemeClr>
-            </a:solidFill>
-          </a:ln>
-        </p:spPr>
-        <p:style>
-          <a:lnRef idx="2">
-            <a:schemeClr val="accent1">
-              <a:shade val="50000"/>
-            </a:schemeClr>
-          </a:lnRef>
-          <a:fillRef idx="1">
-            <a:schemeClr val="accent1"/>
-          </a:fillRef>
-          <a:effectRef idx="0">
-            <a:schemeClr val="accent1"/>
-          </a:effectRef>
-          <a:fontRef idx="minor">
-            <a:schemeClr val="lt1"/>
-          </a:fontRef>
-        </p:style>
-        <p:txBody>
-          <a:bodyPr rtlCol="0" anchor="ctr"/>
-          <a:lstStyle/>
-          <a:p>
-            <a:pPr algn="ctr"/>
-            <a:r>
-              <a:rPr lang="es-MX" dirty="0"/>
-              <a:t>Solución</a:t>
-            </a:r>
-            <a:r>
-              <a:rPr lang="es-PE" dirty="0"/>
-              <a:t> al problema</a:t>
-            </a:r>
-          </a:p>
-        </p:txBody>
-      </p:sp>
-      <p:sp>
-        <p:nvSpPr>
-          <p:cNvPr id="10" name="Rectángulo redondeado 9"/>
-          <p:cNvSpPr/>
-          <p:nvPr/>
-        </p:nvSpPr>
-        <p:spPr>
-          <a:xfrm>
-            <a:off x="3851920" y="5121188"/>
-            <a:ext cx="1368152" cy="648072"/>
-          </a:xfrm>
-          <a:prstGeom prst="roundRect">
-            <a:avLst/>
-          </a:prstGeom>
-          <a:solidFill>
-            <a:schemeClr val="accent1"/>
-          </a:solidFill>
-          <a:ln>
-            <a:solidFill>
-              <a:schemeClr val="tx2"/>
-            </a:solidFill>
-          </a:ln>
-        </p:spPr>
-        <p:style>
-          <a:lnRef idx="2">
-            <a:schemeClr val="accent3">
-              <a:shade val="50000"/>
-            </a:schemeClr>
-          </a:lnRef>
-          <a:fillRef idx="1">
-            <a:schemeClr val="accent3"/>
-          </a:fillRef>
-          <a:effectRef idx="0">
-            <a:schemeClr val="accent3"/>
-          </a:effectRef>
-          <a:fontRef idx="minor">
-            <a:schemeClr val="lt1"/>
-          </a:fontRef>
-        </p:style>
-        <p:txBody>
-          <a:bodyPr rtlCol="0" anchor="ctr"/>
-          <a:lstStyle/>
-          <a:p>
-            <a:pPr algn="ctr"/>
-            <a:r>
-              <a:rPr lang="es-MX" dirty="0"/>
-              <a:t>Juicios y experiencias</a:t>
-            </a:r>
-            <a:endParaRPr lang="es-PE" dirty="0"/>
-          </a:p>
-        </p:txBody>
-      </p:sp>
-      <p:sp>
-        <p:nvSpPr>
-          <p:cNvPr id="11" name="Rectángulo redondeado 10"/>
-          <p:cNvSpPr/>
-          <p:nvPr/>
-        </p:nvSpPr>
-        <p:spPr>
-          <a:xfrm>
-            <a:off x="6660232" y="5121188"/>
-            <a:ext cx="1368152" cy="648072"/>
-          </a:xfrm>
-          <a:prstGeom prst="roundRect">
-            <a:avLst/>
-          </a:prstGeom>
-          <a:solidFill>
-            <a:schemeClr val="bg2">
-              <a:lumMod val="50000"/>
-            </a:schemeClr>
-          </a:solidFill>
-          <a:ln>
-            <a:solidFill>
-              <a:schemeClr val="bg2">
-                <a:lumMod val="10000"/>
-              </a:schemeClr>
-            </a:solidFill>
-          </a:ln>
-        </p:spPr>
-        <p:style>
-          <a:lnRef idx="2">
-            <a:schemeClr val="accent3">
-              <a:shade val="50000"/>
-            </a:schemeClr>
-          </a:lnRef>
-          <a:fillRef idx="1">
-            <a:schemeClr val="accent3"/>
-          </a:fillRef>
-          <a:effectRef idx="0">
-            <a:schemeClr val="accent3"/>
-          </a:effectRef>
-          <a:fontRef idx="minor">
-            <a:schemeClr val="lt1"/>
-          </a:fontRef>
-        </p:style>
-        <p:txBody>
-          <a:bodyPr rtlCol="0" anchor="ctr"/>
-          <a:lstStyle/>
-          <a:p>
-            <a:pPr algn="ctr"/>
-            <a:r>
-              <a:rPr lang="es-MX" dirty="0"/>
-              <a:t>Solución al Modelo</a:t>
-            </a:r>
-            <a:endParaRPr lang="es-PE" dirty="0"/>
-          </a:p>
-        </p:txBody>
-      </p:sp>
-      <p:cxnSp>
-        <p:nvCxnSpPr>
-          <p:cNvPr id="12" name="Conector recto de flecha 11"/>
-          <p:cNvCxnSpPr>
-            <a:stCxn id="7" idx="3"/>
-            <a:endCxn id="6" idx="1"/>
-          </p:cNvCxnSpPr>
-          <p:nvPr/>
-        </p:nvCxnSpPr>
-        <p:spPr>
-          <a:xfrm>
-            <a:off x="2411760" y="3749135"/>
-            <a:ext cx="1440160" cy="0"/>
-          </a:xfrm>
-          <a:prstGeom prst="straightConnector1">
-            <a:avLst/>
-          </a:prstGeom>
-          <a:ln w="28575">
-            <a:tailEnd type="triangle"/>
-          </a:ln>
-        </p:spPr>
-        <p:style>
-          <a:lnRef idx="1">
-            <a:schemeClr val="dk1"/>
-          </a:lnRef>
-          <a:fillRef idx="0">
-            <a:schemeClr val="dk1"/>
-          </a:fillRef>
-          <a:effectRef idx="0">
-            <a:schemeClr val="dk1"/>
-          </a:effectRef>
-          <a:fontRef idx="minor">
-            <a:schemeClr val="tx1"/>
-          </a:fontRef>
-        </p:style>
-      </p:cxnSp>
-      <p:cxnSp>
-        <p:nvCxnSpPr>
-          <p:cNvPr id="14" name="Conector recto de flecha 13"/>
-          <p:cNvCxnSpPr>
-            <a:stCxn id="6" idx="3"/>
-            <a:endCxn id="8" idx="1"/>
-          </p:cNvCxnSpPr>
-          <p:nvPr/>
-        </p:nvCxnSpPr>
-        <p:spPr>
-          <a:xfrm>
-            <a:off x="5220072" y="3749135"/>
-            <a:ext cx="1440160" cy="0"/>
-          </a:xfrm>
-          <a:prstGeom prst="straightConnector1">
-            <a:avLst/>
-          </a:prstGeom>
-          <a:ln w="28575">
-            <a:tailEnd type="triangle"/>
-          </a:ln>
-        </p:spPr>
-        <p:style>
-          <a:lnRef idx="1">
-            <a:schemeClr val="dk1"/>
-          </a:lnRef>
-          <a:fillRef idx="0">
-            <a:schemeClr val="dk1"/>
-          </a:fillRef>
-          <a:effectRef idx="0">
-            <a:schemeClr val="dk1"/>
-          </a:effectRef>
-          <a:fontRef idx="minor">
-            <a:schemeClr val="tx1"/>
-          </a:fontRef>
-        </p:style>
-      </p:cxnSp>
-      <p:sp>
-        <p:nvSpPr>
-          <p:cNvPr id="15" name="CuadroTexto 14"/>
-          <p:cNvSpPr txBox="1"/>
-          <p:nvPr/>
-        </p:nvSpPr>
-        <p:spPr>
-          <a:xfrm>
-            <a:off x="2729742" y="3487525"/>
-            <a:ext cx="804195" cy="523220"/>
-          </a:xfrm>
-          <a:prstGeom prst="rect">
-            <a:avLst/>
-          </a:prstGeom>
-          <a:noFill/>
-        </p:spPr>
-        <p:txBody>
-          <a:bodyPr wrap="none" rtlCol="0">
-            <a:spAutoFit/>
-          </a:bodyPr>
-          <a:lstStyle/>
-          <a:p>
-            <a:pPr algn="ctr"/>
-            <a:r>
-              <a:rPr lang="es-PE" sz="1400" dirty="0"/>
-              <a:t>Variables </a:t>
-            </a:r>
-          </a:p>
-          <a:p>
-            <a:pPr algn="ctr"/>
-            <a:r>
-              <a:rPr lang="es-PE" sz="1400" dirty="0"/>
-              <a:t>relevante</a:t>
-            </a:r>
-          </a:p>
-        </p:txBody>
-      </p:sp>
-      <p:sp>
-        <p:nvSpPr>
-          <p:cNvPr id="16" name="CuadroTexto 15"/>
-          <p:cNvSpPr txBox="1"/>
-          <p:nvPr/>
-        </p:nvSpPr>
-        <p:spPr>
-          <a:xfrm>
-            <a:off x="5482334" y="3487525"/>
-            <a:ext cx="915635" cy="523220"/>
-          </a:xfrm>
-          <a:prstGeom prst="rect">
-            <a:avLst/>
-          </a:prstGeom>
-          <a:noFill/>
-        </p:spPr>
-        <p:txBody>
-          <a:bodyPr wrap="none" rtlCol="0">
-            <a:spAutoFit/>
-          </a:bodyPr>
-          <a:lstStyle/>
-          <a:p>
-            <a:pPr algn="ctr"/>
-            <a:r>
-              <a:rPr lang="es-PE" sz="1400" dirty="0"/>
-              <a:t>Relaciones </a:t>
-            </a:r>
-          </a:p>
-          <a:p>
-            <a:pPr algn="ctr"/>
-            <a:r>
-              <a:rPr lang="es-PE" sz="1400" dirty="0"/>
-              <a:t>relevante</a:t>
-            </a:r>
-          </a:p>
-        </p:txBody>
-      </p:sp>
-      <p:cxnSp>
-        <p:nvCxnSpPr>
-          <p:cNvPr id="18" name="Conector recto de flecha 17"/>
-          <p:cNvCxnSpPr>
-            <a:stCxn id="8" idx="2"/>
-            <a:endCxn id="11" idx="0"/>
-          </p:cNvCxnSpPr>
-          <p:nvPr/>
-        </p:nvCxnSpPr>
-        <p:spPr>
-          <a:xfrm>
-            <a:off x="7344308" y="4073171"/>
-            <a:ext cx="0" cy="1048017"/>
-          </a:xfrm>
-          <a:prstGeom prst="straightConnector1">
-            <a:avLst/>
-          </a:prstGeom>
-          <a:ln w="28575">
-            <a:tailEnd type="triangle"/>
-          </a:ln>
-        </p:spPr>
-        <p:style>
-          <a:lnRef idx="1">
-            <a:schemeClr val="dk1"/>
-          </a:lnRef>
-          <a:fillRef idx="0">
-            <a:schemeClr val="dk1"/>
-          </a:fillRef>
-          <a:effectRef idx="0">
-            <a:schemeClr val="dk1"/>
-          </a:effectRef>
-          <a:fontRef idx="minor">
-            <a:schemeClr val="tx1"/>
-          </a:fontRef>
-        </p:style>
-      </p:cxnSp>
-      <p:cxnSp>
-        <p:nvCxnSpPr>
-          <p:cNvPr id="20" name="Conector recto de flecha 19"/>
-          <p:cNvCxnSpPr>
-            <a:stCxn id="11" idx="1"/>
-            <a:endCxn id="10" idx="3"/>
-          </p:cNvCxnSpPr>
-          <p:nvPr/>
-        </p:nvCxnSpPr>
-        <p:spPr>
-          <a:xfrm flipH="1">
-            <a:off x="5220072" y="5445224"/>
-            <a:ext cx="1440160" cy="0"/>
-          </a:xfrm>
-          <a:prstGeom prst="straightConnector1">
-            <a:avLst/>
-          </a:prstGeom>
-          <a:ln w="28575">
-            <a:tailEnd type="triangle"/>
-          </a:ln>
-        </p:spPr>
-        <p:style>
-          <a:lnRef idx="1">
-            <a:schemeClr val="dk1"/>
-          </a:lnRef>
-          <a:fillRef idx="0">
-            <a:schemeClr val="dk1"/>
-          </a:fillRef>
-          <a:effectRef idx="0">
-            <a:schemeClr val="dk1"/>
-          </a:effectRef>
-          <a:fontRef idx="minor">
-            <a:schemeClr val="tx1"/>
-          </a:fontRef>
-        </p:style>
-      </p:cxnSp>
-      <p:cxnSp>
-        <p:nvCxnSpPr>
-          <p:cNvPr id="22" name="Conector recto de flecha 21"/>
-          <p:cNvCxnSpPr>
-            <a:stCxn id="10" idx="1"/>
-            <a:endCxn id="9" idx="3"/>
-          </p:cNvCxnSpPr>
-          <p:nvPr/>
-        </p:nvCxnSpPr>
-        <p:spPr>
-          <a:xfrm flipH="1">
-            <a:off x="2411760" y="5445224"/>
-            <a:ext cx="1440160" cy="0"/>
-          </a:xfrm>
-          <a:prstGeom prst="straightConnector1">
-            <a:avLst/>
-          </a:prstGeom>
-          <a:ln w="28575">
-            <a:tailEnd type="triangle"/>
-          </a:ln>
-        </p:spPr>
-        <p:style>
-          <a:lnRef idx="1">
-            <a:schemeClr val="dk1"/>
-          </a:lnRef>
-          <a:fillRef idx="0">
-            <a:schemeClr val="dk1"/>
-          </a:fillRef>
-          <a:effectRef idx="0">
-            <a:schemeClr val="dk1"/>
-          </a:effectRef>
-          <a:fontRef idx="minor">
-            <a:schemeClr val="tx1"/>
-          </a:fontRef>
-        </p:style>
-      </p:cxnSp>
-      <p:cxnSp>
-        <p:nvCxnSpPr>
-          <p:cNvPr id="24" name="Conector recto de flecha 23"/>
-          <p:cNvCxnSpPr>
-            <a:stCxn id="9" idx="0"/>
-            <a:endCxn id="7" idx="2"/>
-          </p:cNvCxnSpPr>
-          <p:nvPr/>
-        </p:nvCxnSpPr>
-        <p:spPr>
-          <a:xfrm flipV="1">
-            <a:off x="1691680" y="4109175"/>
-            <a:ext cx="0" cy="976009"/>
-          </a:xfrm>
-          <a:prstGeom prst="straightConnector1">
-            <a:avLst/>
-          </a:prstGeom>
-          <a:ln w="28575">
-            <a:tailEnd type="triangle"/>
-          </a:ln>
-        </p:spPr>
-        <p:style>
-          <a:lnRef idx="1">
-            <a:schemeClr val="dk1"/>
-          </a:lnRef>
-          <a:fillRef idx="0">
-            <a:schemeClr val="dk1"/>
-          </a:fillRef>
-          <a:effectRef idx="0">
-            <a:schemeClr val="dk1"/>
-          </a:effectRef>
-          <a:fontRef idx="minor">
-            <a:schemeClr val="tx1"/>
-          </a:fontRef>
-        </p:style>
-      </p:cxnSp>
-      <p:cxnSp>
-        <p:nvCxnSpPr>
-          <p:cNvPr id="26" name="Conector recto de flecha 25"/>
-          <p:cNvCxnSpPr>
-            <a:stCxn id="10" idx="0"/>
-            <a:endCxn id="6" idx="2"/>
-          </p:cNvCxnSpPr>
-          <p:nvPr/>
-        </p:nvCxnSpPr>
-        <p:spPr>
-          <a:xfrm flipV="1">
-            <a:off x="4535996" y="4073171"/>
-            <a:ext cx="0" cy="1048017"/>
-          </a:xfrm>
-          <a:prstGeom prst="straightConnector1">
-            <a:avLst/>
-          </a:prstGeom>
-          <a:ln w="28575">
-            <a:tailEnd type="triangle"/>
-          </a:ln>
-        </p:spPr>
-        <p:style>
-          <a:lnRef idx="1">
-            <a:schemeClr val="dk1"/>
-          </a:lnRef>
-          <a:fillRef idx="0">
-            <a:schemeClr val="dk1"/>
-          </a:fillRef>
-          <a:effectRef idx="0">
-            <a:schemeClr val="dk1"/>
-          </a:effectRef>
-          <a:fontRef idx="minor">
-            <a:schemeClr val="tx1"/>
-          </a:fontRef>
-        </p:style>
-      </p:cxnSp>
-      <p:sp>
-        <p:nvSpPr>
-          <p:cNvPr id="28" name="CuadroTexto 27"/>
-          <p:cNvSpPr txBox="1"/>
-          <p:nvPr/>
-        </p:nvSpPr>
-        <p:spPr>
-          <a:xfrm rot="5400000">
-            <a:off x="7153249" y="4366347"/>
-            <a:ext cx="814647" cy="461665"/>
-          </a:xfrm>
-          <a:prstGeom prst="rect">
-            <a:avLst/>
-          </a:prstGeom>
-          <a:noFill/>
-        </p:spPr>
-        <p:txBody>
-          <a:bodyPr wrap="none" rtlCol="0">
-            <a:spAutoFit/>
-          </a:bodyPr>
-          <a:lstStyle/>
-          <a:p>
-            <a:pPr algn="ctr"/>
-            <a:r>
-              <a:rPr lang="es-PE" sz="1200" dirty="0"/>
-              <a:t>Método</a:t>
-            </a:r>
-          </a:p>
-          <a:p>
-            <a:pPr algn="ctr"/>
-            <a:r>
-              <a:rPr lang="es-PE" sz="1200" dirty="0"/>
-              <a:t>de solución</a:t>
-            </a:r>
-          </a:p>
-        </p:txBody>
-      </p:sp>
-      <p:sp>
-        <p:nvSpPr>
-          <p:cNvPr id="29" name="CuadroTexto 28"/>
-          <p:cNvSpPr txBox="1"/>
-          <p:nvPr/>
-        </p:nvSpPr>
-        <p:spPr>
-          <a:xfrm>
-            <a:off x="5384426" y="5183614"/>
-            <a:ext cx="1111458" cy="307777"/>
-          </a:xfrm>
-          <a:prstGeom prst="rect">
-            <a:avLst/>
-          </a:prstGeom>
-          <a:noFill/>
-        </p:spPr>
-        <p:txBody>
-          <a:bodyPr wrap="none" rtlCol="0">
-            <a:spAutoFit/>
-          </a:bodyPr>
-          <a:lstStyle/>
-          <a:p>
-            <a:pPr algn="ctr"/>
-            <a:r>
-              <a:rPr lang="es-PE" sz="1400" dirty="0"/>
-              <a:t>Interpretación</a:t>
-            </a:r>
-          </a:p>
-        </p:txBody>
-      </p:sp>
-      <p:sp>
-        <p:nvSpPr>
-          <p:cNvPr id="30" name="CuadroTexto 29"/>
-          <p:cNvSpPr txBox="1"/>
-          <p:nvPr/>
-        </p:nvSpPr>
-        <p:spPr>
-          <a:xfrm>
-            <a:off x="2693257" y="5183614"/>
-            <a:ext cx="877164" cy="307777"/>
-          </a:xfrm>
-          <a:prstGeom prst="rect">
-            <a:avLst/>
-          </a:prstGeom>
-          <a:noFill/>
-        </p:spPr>
-        <p:txBody>
-          <a:bodyPr wrap="none" rtlCol="0">
-            <a:spAutoFit/>
-          </a:bodyPr>
-          <a:lstStyle/>
-          <a:p>
-            <a:pPr algn="ctr"/>
-            <a:r>
-              <a:rPr lang="es-PE" sz="1400" dirty="0"/>
-              <a:t>Decisiones</a:t>
-            </a:r>
-          </a:p>
-        </p:txBody>
-      </p:sp>
-      <p:sp>
-        <p:nvSpPr>
-          <p:cNvPr id="31" name="CuadroTexto 30"/>
-          <p:cNvSpPr txBox="1"/>
-          <p:nvPr/>
-        </p:nvSpPr>
-        <p:spPr>
-          <a:xfrm rot="5400000">
-            <a:off x="1287402" y="4458681"/>
-            <a:ext cx="1085554" cy="276999"/>
-          </a:xfrm>
-          <a:prstGeom prst="rect">
-            <a:avLst/>
-          </a:prstGeom>
-          <a:noFill/>
-        </p:spPr>
-        <p:txBody>
-          <a:bodyPr wrap="none" rtlCol="0">
-            <a:spAutoFit/>
-          </a:bodyPr>
-          <a:lstStyle/>
-          <a:p>
-            <a:pPr algn="ctr"/>
-            <a:r>
-              <a:rPr lang="es-PE" sz="1200" dirty="0"/>
-              <a:t>Implementación</a:t>
+              <a:rPr lang="es-MX" sz="2400" b="1" dirty="0"/>
+              <a:t>Modelador: </a:t>
+            </a:r>
+            <a:r>
+              <a:rPr lang="es-MX" sz="2400" dirty="0"/>
+              <a:t>desarrollo del modelo.</a:t>
+            </a:r>
+          </a:p>
+          <a:p>
+            <a:pPr marL="285750" indent="-285750" algn="just">
+              <a:buFont typeface="Arial" panose="020B0604020202020204" pitchFamily="34" charset="0"/>
+              <a:buChar char="•"/>
+            </a:pPr>
+            <a:r>
+              <a:rPr lang="es-MX" sz="2400" b="1" dirty="0"/>
+              <a:t>Experto:</a:t>
+            </a:r>
+            <a:r>
+              <a:rPr lang="es-MX" sz="2400" dirty="0"/>
+              <a:t> conocimiento de la realidad del problema</a:t>
             </a:r>
           </a:p>
         </p:txBody>
@@ -8246,7 +7524,7 @@
           <a:p>
             <a:r>
               <a:rPr lang="es-PE" altLang="en-US" dirty="0"/>
-              <a:t>Modelo vs Realidad</a:t>
+              <a:t>Modelamiento matemático: Riesgos</a:t>
             </a:r>
           </a:p>
         </p:txBody>
@@ -8260,7 +7538,80 @@
         <p:spPr>
           <a:xfrm>
             <a:off x="602191" y="836712"/>
-            <a:ext cx="8002257" cy="2862322"/>
+            <a:ext cx="8002257" cy="1938992"/>
+          </a:xfrm>
+          <a:prstGeom prst="rect">
+            <a:avLst/>
+          </a:prstGeom>
+          <a:noFill/>
+        </p:spPr>
+        <p:txBody>
+          <a:bodyPr wrap="square" rtlCol="0">
+            <a:spAutoFit/>
+          </a:bodyPr>
+          <a:lstStyle/>
+          <a:p>
+            <a:pPr marL="285750" indent="-285750" algn="just">
+              <a:buFont typeface="Arial" panose="020B0604020202020204" pitchFamily="34" charset="0"/>
+              <a:buChar char="•"/>
+            </a:pPr>
+            <a:r>
+              <a:rPr lang="es-MX" sz="2000" dirty="0"/>
+              <a:t>Equilibrio entre una representación detallada y capacidad de obtener una solución</a:t>
+            </a:r>
+          </a:p>
+          <a:p>
+            <a:pPr marL="285750" indent="-285750" algn="just">
+              <a:buFont typeface="Arial" panose="020B0604020202020204" pitchFamily="34" charset="0"/>
+              <a:buChar char="•"/>
+            </a:pPr>
+            <a:r>
+              <a:rPr lang="es-MX" sz="2000" b="1" dirty="0"/>
+              <a:t>Modelamiento exhaustivo:</a:t>
+            </a:r>
+          </a:p>
+          <a:p>
+            <a:pPr marL="742950" lvl="1" indent="-285750" algn="just">
+              <a:buFont typeface="Arial" panose="020B0604020202020204" pitchFamily="34" charset="0"/>
+              <a:buChar char="•"/>
+            </a:pPr>
+            <a:r>
+              <a:rPr lang="es-MX" sz="2000" dirty="0"/>
+              <a:t>Es casi real, puede ser irresoluble.</a:t>
+            </a:r>
+          </a:p>
+          <a:p>
+            <a:pPr marL="285750" indent="-285750" algn="just">
+              <a:buFont typeface="Arial" panose="020B0604020202020204" pitchFamily="34" charset="0"/>
+              <a:buChar char="•"/>
+            </a:pPr>
+            <a:r>
+              <a:rPr lang="es-MX" sz="2000" b="1" dirty="0"/>
+              <a:t>Modelamiento simple:</a:t>
+            </a:r>
+          </a:p>
+          <a:p>
+            <a:pPr marL="742950" lvl="1" indent="-285750" algn="just">
+              <a:buFont typeface="Arial" panose="020B0604020202020204" pitchFamily="34" charset="0"/>
+              <a:buChar char="•"/>
+            </a:pPr>
+            <a:r>
+              <a:rPr lang="es-MX" sz="2000" dirty="0"/>
+              <a:t>Rudimentario, muchos métodos por el que se puede ser resuelto. Sin embargo, es posible obtener una solución que no se adecue a la realidad</a:t>
+            </a:r>
+          </a:p>
+        </p:txBody>
+      </p:sp>
+      <p:sp>
+        <p:nvSpPr>
+          <p:cNvPr id="6" name="CuadroTexto 5"/>
+          <p:cNvSpPr txBox="1"/>
+          <p:nvPr/>
+        </p:nvSpPr>
+        <p:spPr>
+          <a:xfrm>
+            <a:off x="602190" y="2966656"/>
+            <a:ext cx="8002257" cy="1938992"/>
           </a:xfrm>
           <a:prstGeom prst="rect">
             <a:avLst/>
@@ -8299,15 +7650,17 @@
             </a:pPr>
             <a:r>
               <a:rPr lang="es-PE" sz="2000" dirty="0"/>
-              <a:t>Falta de experiencia </a:t>
-            </a:r>
-            <a:r>
-              <a:rPr lang="es-PE" sz="2000"/>
-              <a:t>y capacitación del </a:t>
-            </a:r>
+              <a:t>Falta de experiencia y capacitación del modelador</a:t>
+            </a:r>
+          </a:p>
+          <a:p>
+            <a:pPr marL="285750" indent="-285750">
+              <a:buFont typeface="Arial" panose="020B0604020202020204" pitchFamily="34" charset="0"/>
+              <a:buChar char="•"/>
+            </a:pPr>
             <a:r>
               <a:rPr lang="es-PE" sz="2000" dirty="0"/>
-              <a:t>modelador</a:t>
+              <a:t>El concepto de modelo adecuado varía con el tiempo, debido a que los modelos complejos de hoy pueden ser modelos adecuado en el futuro.</a:t>
             </a:r>
           </a:p>
           <a:p>
@@ -8317,6 +7670,177 @@
             </a:pPr>
             <a:endParaRPr lang="es-MX" sz="2000" dirty="0"/>
           </a:p>
+        </p:txBody>
+      </p:sp>
+      <p:sp>
+        <p:nvSpPr>
+          <p:cNvPr id="7" name="CuadroTexto 6"/>
+          <p:cNvSpPr txBox="1"/>
+          <p:nvPr/>
+        </p:nvSpPr>
+        <p:spPr>
+          <a:xfrm>
+            <a:off x="611560" y="5149641"/>
+            <a:ext cx="7992888" cy="1015663"/>
+          </a:xfrm>
+          <a:prstGeom prst="rect">
+            <a:avLst/>
+          </a:prstGeom>
+          <a:noFill/>
+        </p:spPr>
+        <p:txBody>
+          <a:bodyPr wrap="square" rtlCol="0">
+            <a:spAutoFit/>
+          </a:bodyPr>
+          <a:lstStyle/>
+          <a:p>
+            <a:pPr algn="ctr"/>
+            <a:r>
+              <a:rPr lang="es-MX" sz="2000" dirty="0">
+                <a:latin typeface="Lucida Calligraphy" panose="03010101010101010101" pitchFamily="66" charset="0"/>
+              </a:rPr>
+              <a:t>La relación entre el modelo y la método de solución es relativo y depende de la tecnología de la época.</a:t>
+            </a:r>
+          </a:p>
+          <a:p>
+            <a:pPr algn="ctr"/>
+            <a:endParaRPr lang="es-PE" sz="2000" dirty="0">
+              <a:latin typeface="Lucida Calligraphy" panose="03010101010101010101" pitchFamily="66" charset="0"/>
+            </a:endParaRPr>
+          </a:p>
+        </p:txBody>
+      </p:sp>
+    </p:spTree>
+    <p:extLst>
+      <p:ext uri="{BB962C8B-B14F-4D97-AF65-F5344CB8AC3E}">
+        <p14:creationId xmlns:p14="http://schemas.microsoft.com/office/powerpoint/2010/main" val="2641132465"/>
+      </p:ext>
+    </p:extLst>
+  </p:cSld>
+  <p:clrMapOvr>
+    <a:masterClrMapping/>
+  </p:clrMapOvr>
+  <p:transition spd="slow">
+    <p:fade/>
+  </p:transition>
+</p:sld>
+</file>
+
+<file path=ppt/slides/slide7.xml><?xml version="1.0" encoding="utf-8"?>
+<p:sld xmlns:a="http://schemas.openxmlformats.org/drawingml/2006/main" xmlns:r="http://schemas.openxmlformats.org/officeDocument/2006/relationships" xmlns:p="http://schemas.openxmlformats.org/presentationml/2006/main">
+  <p:cSld>
+    <p:spTree>
+      <p:nvGrpSpPr>
+        <p:cNvPr id="1" name=""/>
+        <p:cNvGrpSpPr/>
+        <p:nvPr/>
+      </p:nvGrpSpPr>
+      <p:grpSpPr>
+        <a:xfrm>
+          <a:off x="0" y="0"/>
+          <a:ext cx="0" cy="0"/>
+          <a:chOff x="0" y="0"/>
+          <a:chExt cx="0" cy="0"/>
+        </a:xfrm>
+      </p:grpSpPr>
+      <p:sp>
+        <p:nvSpPr>
+          <p:cNvPr id="2" name="Marcador de número de diapositiva 1"/>
+          <p:cNvSpPr>
+            <a:spLocks noGrp="1"/>
+          </p:cNvSpPr>
+          <p:nvPr>
+            <p:ph type="sldNum" sz="quarter" idx="12"/>
+          </p:nvPr>
+        </p:nvSpPr>
+        <p:spPr/>
+        <p:txBody>
+          <a:bodyPr/>
+          <a:lstStyle/>
+          <a:p>
+            <a:fld id="{64BD7E74-CBD2-4D88-9109-2EA8081AE675}" type="slidenum">
+              <a:rPr lang="es-ES" smtClean="0"/>
+              <a:pPr/>
+              <a:t>7</a:t>
+            </a:fld>
+            <a:endParaRPr lang="es-ES"/>
+          </a:p>
+        </p:txBody>
+      </p:sp>
+      <p:sp>
+        <p:nvSpPr>
+          <p:cNvPr id="3" name="4 Título"/>
+          <p:cNvSpPr txBox="1">
+            <a:spLocks/>
+          </p:cNvSpPr>
+          <p:nvPr/>
+        </p:nvSpPr>
+        <p:spPr>
+          <a:xfrm>
+            <a:off x="611560" y="188640"/>
+            <a:ext cx="8784976" cy="457120"/>
+          </a:xfrm>
+          <a:prstGeom prst="rect">
+            <a:avLst/>
+          </a:prstGeom>
+        </p:spPr>
+        <p:txBody>
+          <a:bodyPr bIns="91440" anchor="b" anchorCtr="0">
+            <a:noAutofit/>
+          </a:bodyPr>
+          <a:lstStyle>
+            <a:lvl1pPr>
+              <a:spcBef>
+                <a:spcPct val="0"/>
+              </a:spcBef>
+              <a:buNone/>
+              <a:defRPr kumimoji="0" sz="2400">
+                <a:ln w="0"/>
+                <a:solidFill>
+                  <a:schemeClr val="tx2"/>
+                </a:solidFill>
+                <a:effectLst>
+                  <a:outerShdw blurRad="38100" dist="19050" dir="2700000" algn="tl" rotWithShape="0">
+                    <a:schemeClr val="dk1">
+                      <a:alpha val="40000"/>
+                    </a:schemeClr>
+                  </a:outerShdw>
+                </a:effectLst>
+                <a:latin typeface="+mj-lt"/>
+                <a:ea typeface="+mj-ea"/>
+                <a:cs typeface="+mj-cs"/>
+              </a:defRPr>
+            </a:lvl1pPr>
+          </a:lstStyle>
+          <a:p>
+            <a:r>
+              <a:rPr lang="es-PE" altLang="en-US" dirty="0"/>
+              <a:t>Modelo vs Realidad &amp; Clasificación</a:t>
+            </a:r>
+          </a:p>
+        </p:txBody>
+      </p:sp>
+      <p:sp>
+        <p:nvSpPr>
+          <p:cNvPr id="5" name="CuadroTexto 4"/>
+          <p:cNvSpPr txBox="1"/>
+          <p:nvPr/>
+        </p:nvSpPr>
+        <p:spPr>
+          <a:xfrm>
+            <a:off x="602191" y="836712"/>
+            <a:ext cx="8002257" cy="1938992"/>
+          </a:xfrm>
+          <a:prstGeom prst="rect">
+            <a:avLst/>
+          </a:prstGeom>
+          <a:noFill/>
+        </p:spPr>
+        <p:txBody>
+          <a:bodyPr wrap="square" rtlCol="0">
+            <a:spAutoFit/>
+          </a:bodyPr>
+          <a:lstStyle/>
           <a:p>
             <a:pPr marL="285750" indent="-285750">
               <a:buFont typeface="Arial" panose="020B0604020202020204" pitchFamily="34" charset="0"/>
@@ -8324,6 +7848,371 @@
             </a:pPr>
             <a:r>
               <a:rPr lang="es-MX" sz="2000" dirty="0"/>
+              <a:t>Menos datos y más hipótesis para obtención rápida de resultados.</a:t>
+            </a:r>
+          </a:p>
+          <a:p>
+            <a:pPr marL="285750" indent="-285750">
+              <a:buFont typeface="Arial" panose="020B0604020202020204" pitchFamily="34" charset="0"/>
+              <a:buChar char="•"/>
+            </a:pPr>
+            <a:r>
+              <a:rPr lang="es-MX" sz="2000" dirty="0"/>
+              <a:t>Definición defectuosa del problema</a:t>
+            </a:r>
+          </a:p>
+          <a:p>
+            <a:pPr marL="285750" indent="-285750">
+              <a:buFont typeface="Arial" panose="020B0604020202020204" pitchFamily="34" charset="0"/>
+              <a:buChar char="•"/>
+            </a:pPr>
+            <a:r>
+              <a:rPr lang="es-PE" sz="2000" dirty="0"/>
+              <a:t>Falta de experiencia y capacitación del modelador</a:t>
+            </a:r>
+          </a:p>
+          <a:p>
+            <a:pPr marL="285750" indent="-285750">
+              <a:buFont typeface="Arial" panose="020B0604020202020204" pitchFamily="34" charset="0"/>
+              <a:buChar char="•"/>
+            </a:pPr>
+            <a:r>
+              <a:rPr lang="es-PE" sz="2000" dirty="0"/>
+              <a:t>El concepto de modelo adecuado varía con el tiempo, debido a que los modelos complejos de hoy pueden ser modelos adecuado en el futuro.</a:t>
+            </a:r>
+          </a:p>
+          <a:p>
+            <a:pPr marL="285750" indent="-285750">
+              <a:buFont typeface="Arial" panose="020B0604020202020204" pitchFamily="34" charset="0"/>
+              <a:buChar char="•"/>
+            </a:pPr>
+            <a:endParaRPr lang="es-MX" sz="2000" dirty="0"/>
+          </a:p>
+        </p:txBody>
+      </p:sp>
+      <p:sp>
+        <p:nvSpPr>
+          <p:cNvPr id="4" name="CuadroTexto 3"/>
+          <p:cNvSpPr txBox="1"/>
+          <p:nvPr/>
+        </p:nvSpPr>
+        <p:spPr>
+          <a:xfrm>
+            <a:off x="611560" y="2701369"/>
+            <a:ext cx="7992888" cy="1015663"/>
+          </a:xfrm>
+          <a:prstGeom prst="rect">
+            <a:avLst/>
+          </a:prstGeom>
+          <a:noFill/>
+        </p:spPr>
+        <p:txBody>
+          <a:bodyPr wrap="square" rtlCol="0">
+            <a:spAutoFit/>
+          </a:bodyPr>
+          <a:lstStyle/>
+          <a:p>
+            <a:pPr algn="ctr"/>
+            <a:r>
+              <a:rPr lang="es-MX" sz="2000" dirty="0">
+                <a:latin typeface="Lucida Calligraphy" panose="03010101010101010101" pitchFamily="66" charset="0"/>
+              </a:rPr>
+              <a:t>La relación entre el modelo y la método de solución es relativo y depende de la tecnología de la época.</a:t>
+            </a:r>
+          </a:p>
+          <a:p>
+            <a:pPr algn="ctr"/>
+            <a:endParaRPr lang="es-PE" sz="2000" dirty="0">
+              <a:latin typeface="Lucida Calligraphy" panose="03010101010101010101" pitchFamily="66" charset="0"/>
+            </a:endParaRPr>
+          </a:p>
+        </p:txBody>
+      </p:sp>
+      <p:sp>
+        <p:nvSpPr>
+          <p:cNvPr id="8" name="Rectángulo redondeado 7"/>
+          <p:cNvSpPr/>
+          <p:nvPr/>
+        </p:nvSpPr>
+        <p:spPr>
+          <a:xfrm>
+            <a:off x="5508104" y="3789040"/>
+            <a:ext cx="2592288" cy="1997330"/>
+          </a:xfrm>
+          <a:prstGeom prst="roundRect">
+            <a:avLst/>
+          </a:prstGeom>
+        </p:spPr>
+        <p:style>
+          <a:lnRef idx="1">
+            <a:schemeClr val="dk1"/>
+          </a:lnRef>
+          <a:fillRef idx="2">
+            <a:schemeClr val="dk1"/>
+          </a:fillRef>
+          <a:effectRef idx="1">
+            <a:schemeClr val="dk1"/>
+          </a:effectRef>
+          <a:fontRef idx="minor">
+            <a:schemeClr val="dk1"/>
+          </a:fontRef>
+        </p:style>
+        <p:txBody>
+          <a:bodyPr rtlCol="0" anchor="ctr"/>
+          <a:lstStyle/>
+          <a:p>
+            <a:r>
+              <a:rPr lang="es-PE" sz="2000" dirty="0"/>
+              <a:t>Según la características del tiempo:</a:t>
+            </a:r>
+          </a:p>
+          <a:p>
+            <a:pPr marL="342900" indent="-342900">
+              <a:buFont typeface="Arial" panose="020B0604020202020204" pitchFamily="34" charset="0"/>
+              <a:buChar char="•"/>
+            </a:pPr>
+            <a:r>
+              <a:rPr lang="es-PE" sz="2000" dirty="0"/>
+              <a:t>Estático</a:t>
+            </a:r>
+          </a:p>
+          <a:p>
+            <a:pPr marL="342900" indent="-342900">
+              <a:buFont typeface="Arial" panose="020B0604020202020204" pitchFamily="34" charset="0"/>
+              <a:buChar char="•"/>
+            </a:pPr>
+            <a:r>
+              <a:rPr lang="es-PE" sz="2000" dirty="0"/>
+              <a:t>Dinámico</a:t>
+            </a:r>
+          </a:p>
+          <a:p>
+            <a:pPr marL="342900" indent="-342900">
+              <a:buFont typeface="Arial" panose="020B0604020202020204" pitchFamily="34" charset="0"/>
+              <a:buChar char="•"/>
+            </a:pPr>
+            <a:endParaRPr lang="es-PE" sz="2000" dirty="0"/>
+          </a:p>
+        </p:txBody>
+      </p:sp>
+      <p:sp>
+        <p:nvSpPr>
+          <p:cNvPr id="9" name="Rectángulo redondeado 8"/>
+          <p:cNvSpPr/>
+          <p:nvPr/>
+        </p:nvSpPr>
+        <p:spPr>
+          <a:xfrm>
+            <a:off x="1191951" y="3789040"/>
+            <a:ext cx="2659969" cy="1997330"/>
+          </a:xfrm>
+          <a:prstGeom prst="roundRect">
+            <a:avLst/>
+          </a:prstGeom>
+        </p:spPr>
+        <p:style>
+          <a:lnRef idx="1">
+            <a:schemeClr val="dk1"/>
+          </a:lnRef>
+          <a:fillRef idx="2">
+            <a:schemeClr val="dk1"/>
+          </a:fillRef>
+          <a:effectRef idx="1">
+            <a:schemeClr val="dk1"/>
+          </a:effectRef>
+          <a:fontRef idx="minor">
+            <a:schemeClr val="dk1"/>
+          </a:fontRef>
+        </p:style>
+        <p:txBody>
+          <a:bodyPr rtlCol="0" anchor="ctr"/>
+          <a:lstStyle/>
+          <a:p>
+            <a:r>
+              <a:rPr lang="es-PE" sz="2000" dirty="0"/>
+              <a:t>Según la disposición de información:</a:t>
+            </a:r>
+          </a:p>
+          <a:p>
+            <a:pPr marL="285750" indent="-285750">
+              <a:buFont typeface="Arial" panose="020B0604020202020204" pitchFamily="34" charset="0"/>
+              <a:buChar char="•"/>
+            </a:pPr>
+            <a:r>
+              <a:rPr lang="es-PE" sz="2000" dirty="0"/>
+              <a:t>Determinístico</a:t>
+            </a:r>
+          </a:p>
+          <a:p>
+            <a:pPr marL="285750" indent="-285750">
+              <a:buFont typeface="Arial" panose="020B0604020202020204" pitchFamily="34" charset="0"/>
+              <a:buChar char="•"/>
+            </a:pPr>
+            <a:r>
+              <a:rPr lang="es-PE" sz="2000" dirty="0"/>
+              <a:t>Estocástico</a:t>
+            </a:r>
+          </a:p>
+          <a:p>
+            <a:pPr marL="285750" indent="-285750">
+              <a:buFont typeface="Arial" panose="020B0604020202020204" pitchFamily="34" charset="0"/>
+              <a:buChar char="•"/>
+            </a:pPr>
+            <a:r>
+              <a:rPr lang="es-PE" sz="2000" dirty="0"/>
+              <a:t>Puramente incierto</a:t>
+            </a:r>
+          </a:p>
+        </p:txBody>
+      </p:sp>
+    </p:spTree>
+    <p:extLst>
+      <p:ext uri="{BB962C8B-B14F-4D97-AF65-F5344CB8AC3E}">
+        <p14:creationId xmlns:p14="http://schemas.microsoft.com/office/powerpoint/2010/main" val="147473549"/>
+      </p:ext>
+    </p:extLst>
+  </p:cSld>
+  <p:clrMapOvr>
+    <a:masterClrMapping/>
+  </p:clrMapOvr>
+  <p:transition spd="slow">
+    <p:fade/>
+  </p:transition>
+</p:sld>
+</file>
+
+<file path=ppt/slides/slide8.xml><?xml version="1.0" encoding="utf-8"?>
+<p:sld xmlns:a="http://schemas.openxmlformats.org/drawingml/2006/main" xmlns:r="http://schemas.openxmlformats.org/officeDocument/2006/relationships" xmlns:p="http://schemas.openxmlformats.org/presentationml/2006/main">
+  <p:cSld>
+    <p:spTree>
+      <p:nvGrpSpPr>
+        <p:cNvPr id="1" name=""/>
+        <p:cNvGrpSpPr/>
+        <p:nvPr/>
+      </p:nvGrpSpPr>
+      <p:grpSpPr>
+        <a:xfrm>
+          <a:off x="0" y="0"/>
+          <a:ext cx="0" cy="0"/>
+          <a:chOff x="0" y="0"/>
+          <a:chExt cx="0" cy="0"/>
+        </a:xfrm>
+      </p:grpSpPr>
+      <p:sp>
+        <p:nvSpPr>
+          <p:cNvPr id="2" name="Marcador de número de diapositiva 1"/>
+          <p:cNvSpPr>
+            <a:spLocks noGrp="1"/>
+          </p:cNvSpPr>
+          <p:nvPr>
+            <p:ph type="sldNum" sz="quarter" idx="12"/>
+          </p:nvPr>
+        </p:nvSpPr>
+        <p:spPr/>
+        <p:txBody>
+          <a:bodyPr/>
+          <a:lstStyle/>
+          <a:p>
+            <a:fld id="{64BD7E74-CBD2-4D88-9109-2EA8081AE675}" type="slidenum">
+              <a:rPr lang="es-ES" smtClean="0"/>
+              <a:pPr/>
+              <a:t>8</a:t>
+            </a:fld>
+            <a:endParaRPr lang="es-ES"/>
+          </a:p>
+        </p:txBody>
+      </p:sp>
+      <p:sp>
+        <p:nvSpPr>
+          <p:cNvPr id="3" name="4 Título"/>
+          <p:cNvSpPr txBox="1">
+            <a:spLocks/>
+          </p:cNvSpPr>
+          <p:nvPr/>
+        </p:nvSpPr>
+        <p:spPr>
+          <a:xfrm>
+            <a:off x="611560" y="188640"/>
+            <a:ext cx="8784976" cy="457120"/>
+          </a:xfrm>
+          <a:prstGeom prst="rect">
+            <a:avLst/>
+          </a:prstGeom>
+        </p:spPr>
+        <p:txBody>
+          <a:bodyPr bIns="91440" anchor="b" anchorCtr="0">
+            <a:noAutofit/>
+          </a:bodyPr>
+          <a:lstStyle>
+            <a:lvl1pPr>
+              <a:spcBef>
+                <a:spcPct val="0"/>
+              </a:spcBef>
+              <a:buNone/>
+              <a:defRPr kumimoji="0" sz="2400">
+                <a:ln w="0"/>
+                <a:solidFill>
+                  <a:schemeClr val="tx2"/>
+                </a:solidFill>
+                <a:effectLst>
+                  <a:outerShdw blurRad="38100" dist="19050" dir="2700000" algn="tl" rotWithShape="0">
+                    <a:schemeClr val="dk1">
+                      <a:alpha val="40000"/>
+                    </a:schemeClr>
+                  </a:outerShdw>
+                </a:effectLst>
+                <a:latin typeface="+mj-lt"/>
+                <a:ea typeface="+mj-ea"/>
+                <a:cs typeface="+mj-cs"/>
+              </a:defRPr>
+            </a:lvl1pPr>
+          </a:lstStyle>
+          <a:p>
+            <a:r>
+              <a:rPr lang="es-PE" altLang="en-US" dirty="0"/>
+              <a:t>Modelamiento matemático</a:t>
+            </a:r>
+          </a:p>
+        </p:txBody>
+      </p:sp>
+      <p:sp>
+        <p:nvSpPr>
+          <p:cNvPr id="5" name="CuadroTexto 4"/>
+          <p:cNvSpPr txBox="1"/>
+          <p:nvPr/>
+        </p:nvSpPr>
+        <p:spPr>
+          <a:xfrm>
+            <a:off x="602191" y="836712"/>
+            <a:ext cx="8002257" cy="2246769"/>
+          </a:xfrm>
+          <a:prstGeom prst="rect">
+            <a:avLst/>
+          </a:prstGeom>
+          <a:noFill/>
+        </p:spPr>
+        <p:txBody>
+          <a:bodyPr wrap="square" rtlCol="0">
+            <a:spAutoFit/>
+          </a:bodyPr>
+          <a:lstStyle/>
+          <a:p>
+            <a:pPr marL="285750" indent="-285750">
+              <a:buFont typeface="Arial" panose="020B0604020202020204" pitchFamily="34" charset="0"/>
+              <a:buChar char="•"/>
+            </a:pPr>
+            <a:r>
+              <a:rPr lang="es-MX" sz="2000" dirty="0"/>
+              <a:t>Definición: Proceso de abstracción de la realidad hacia formas matemáticas para representar partes de ella.</a:t>
+            </a:r>
+          </a:p>
+          <a:p>
+            <a:pPr marL="285750" indent="-285750">
+              <a:buFont typeface="Arial" panose="020B0604020202020204" pitchFamily="34" charset="0"/>
+              <a:buChar char="•"/>
+            </a:pPr>
+            <a:r>
+              <a:rPr lang="es-MX" sz="2000" dirty="0"/>
               <a:t>Entonces: </a:t>
             </a:r>
           </a:p>
@@ -8371,56 +8260,23 @@
       </p:sp>
       <p:sp>
         <p:nvSpPr>
-          <p:cNvPr id="4" name="CuadroTexto 3"/>
-          <p:cNvSpPr txBox="1"/>
-          <p:nvPr/>
-        </p:nvSpPr>
-        <p:spPr>
-          <a:xfrm>
-            <a:off x="611560" y="5517232"/>
-            <a:ext cx="7992888" cy="1015663"/>
-          </a:xfrm>
-          <a:prstGeom prst="rect">
-            <a:avLst/>
-          </a:prstGeom>
-          <a:noFill/>
-        </p:spPr>
-        <p:txBody>
-          <a:bodyPr wrap="square" rtlCol="0">
-            <a:spAutoFit/>
-          </a:bodyPr>
-          <a:lstStyle/>
-          <a:p>
-            <a:pPr algn="ctr"/>
-            <a:r>
-              <a:rPr lang="es-MX" sz="2000" dirty="0">
-                <a:latin typeface="Lucida Calligraphy" panose="03010101010101010101" pitchFamily="66" charset="0"/>
-              </a:rPr>
-              <a:t>La relación entre el modelo y la método de solución es relativo y depende de la tecnología de la época.</a:t>
-            </a:r>
-          </a:p>
-          <a:p>
-            <a:pPr algn="ctr"/>
-            <a:endParaRPr lang="es-PE" sz="2000" dirty="0">
-              <a:latin typeface="Lucida Calligraphy" panose="03010101010101010101" pitchFamily="66" charset="0"/>
-            </a:endParaRPr>
-          </a:p>
-        </p:txBody>
-      </p:sp>
-      <p:sp>
-        <p:nvSpPr>
-          <p:cNvPr id="7" name="Nube 6"/>
+          <p:cNvPr id="7" name="Rectángulo redondeado 6"/>
           <p:cNvSpPr/>
           <p:nvPr/>
         </p:nvSpPr>
         <p:spPr>
           <a:xfrm>
-            <a:off x="1187624" y="3212976"/>
+            <a:off x="971600" y="3389095"/>
             <a:ext cx="1440160" cy="720080"/>
           </a:xfrm>
-          <a:prstGeom prst="cloud">
-            <a:avLst/>
-          </a:prstGeom>
+          <a:prstGeom prst="roundRect">
+            <a:avLst/>
+          </a:prstGeom>
+          <a:ln>
+            <a:solidFill>
+              <a:schemeClr val="tx2"/>
+            </a:solidFill>
+          </a:ln>
         </p:spPr>
         <p:style>
           <a:lnRef idx="2">
@@ -8451,10 +8307,738 @@
           </a:p>
         </p:txBody>
       </p:sp>
+      <p:sp>
+        <p:nvSpPr>
+          <p:cNvPr id="6" name="Rectángulo redondeado 5"/>
+          <p:cNvSpPr/>
+          <p:nvPr/>
+        </p:nvSpPr>
+        <p:spPr>
+          <a:xfrm>
+            <a:off x="3851920" y="3425099"/>
+            <a:ext cx="1368152" cy="648072"/>
+          </a:xfrm>
+          <a:prstGeom prst="roundRect">
+            <a:avLst/>
+          </a:prstGeom>
+          <a:solidFill>
+            <a:schemeClr val="accent1"/>
+          </a:solidFill>
+          <a:ln>
+            <a:solidFill>
+              <a:schemeClr val="tx2"/>
+            </a:solidFill>
+          </a:ln>
+        </p:spPr>
+        <p:style>
+          <a:lnRef idx="2">
+            <a:schemeClr val="accent3">
+              <a:shade val="50000"/>
+            </a:schemeClr>
+          </a:lnRef>
+          <a:fillRef idx="1">
+            <a:schemeClr val="accent3"/>
+          </a:fillRef>
+          <a:effectRef idx="0">
+            <a:schemeClr val="accent3"/>
+          </a:effectRef>
+          <a:fontRef idx="minor">
+            <a:schemeClr val="lt1"/>
+          </a:fontRef>
+        </p:style>
+        <p:txBody>
+          <a:bodyPr rtlCol="0" anchor="ctr"/>
+          <a:lstStyle/>
+          <a:p>
+            <a:pPr algn="ctr"/>
+            <a:r>
+              <a:rPr lang="es-MX" dirty="0"/>
+              <a:t>Realidad asumida</a:t>
+            </a:r>
+            <a:endParaRPr lang="es-PE" dirty="0"/>
+          </a:p>
+        </p:txBody>
+      </p:sp>
+      <p:sp>
+        <p:nvSpPr>
+          <p:cNvPr id="8" name="Rectángulo redondeado 7"/>
+          <p:cNvSpPr/>
+          <p:nvPr/>
+        </p:nvSpPr>
+        <p:spPr>
+          <a:xfrm>
+            <a:off x="6660232" y="3425099"/>
+            <a:ext cx="1368152" cy="648072"/>
+          </a:xfrm>
+          <a:prstGeom prst="roundRect">
+            <a:avLst/>
+          </a:prstGeom>
+          <a:solidFill>
+            <a:schemeClr val="accent2">
+              <a:lumMod val="75000"/>
+            </a:schemeClr>
+          </a:solidFill>
+          <a:ln>
+            <a:solidFill>
+              <a:schemeClr val="accent2">
+                <a:lumMod val="50000"/>
+              </a:schemeClr>
+            </a:solidFill>
+          </a:ln>
+        </p:spPr>
+        <p:style>
+          <a:lnRef idx="2">
+            <a:schemeClr val="accent3">
+              <a:shade val="50000"/>
+            </a:schemeClr>
+          </a:lnRef>
+          <a:fillRef idx="1">
+            <a:schemeClr val="accent3"/>
+          </a:fillRef>
+          <a:effectRef idx="0">
+            <a:schemeClr val="accent3"/>
+          </a:effectRef>
+          <a:fontRef idx="minor">
+            <a:schemeClr val="lt1"/>
+          </a:fontRef>
+        </p:style>
+        <p:txBody>
+          <a:bodyPr rtlCol="0" anchor="ctr"/>
+          <a:lstStyle/>
+          <a:p>
+            <a:pPr algn="ctr"/>
+            <a:r>
+              <a:rPr lang="es-MX" dirty="0"/>
+              <a:t>Modelo</a:t>
+            </a:r>
+            <a:endParaRPr lang="es-PE" dirty="0"/>
+          </a:p>
+        </p:txBody>
+      </p:sp>
+      <p:sp>
+        <p:nvSpPr>
+          <p:cNvPr id="9" name="Rectángulo redondeado 8"/>
+          <p:cNvSpPr/>
+          <p:nvPr/>
+        </p:nvSpPr>
+        <p:spPr>
+          <a:xfrm>
+            <a:off x="971600" y="5085184"/>
+            <a:ext cx="1440160" cy="720080"/>
+          </a:xfrm>
+          <a:prstGeom prst="roundRect">
+            <a:avLst/>
+          </a:prstGeom>
+          <a:solidFill>
+            <a:schemeClr val="bg2">
+              <a:lumMod val="50000"/>
+            </a:schemeClr>
+          </a:solidFill>
+          <a:ln>
+            <a:solidFill>
+              <a:schemeClr val="bg2">
+                <a:lumMod val="10000"/>
+              </a:schemeClr>
+            </a:solidFill>
+          </a:ln>
+        </p:spPr>
+        <p:style>
+          <a:lnRef idx="2">
+            <a:schemeClr val="accent1">
+              <a:shade val="50000"/>
+            </a:schemeClr>
+          </a:lnRef>
+          <a:fillRef idx="1">
+            <a:schemeClr val="accent1"/>
+          </a:fillRef>
+          <a:effectRef idx="0">
+            <a:schemeClr val="accent1"/>
+          </a:effectRef>
+          <a:fontRef idx="minor">
+            <a:schemeClr val="lt1"/>
+          </a:fontRef>
+        </p:style>
+        <p:txBody>
+          <a:bodyPr rtlCol="0" anchor="ctr"/>
+          <a:lstStyle/>
+          <a:p>
+            <a:pPr algn="ctr"/>
+            <a:r>
+              <a:rPr lang="es-MX" dirty="0"/>
+              <a:t>Solución</a:t>
+            </a:r>
+            <a:r>
+              <a:rPr lang="es-PE" dirty="0"/>
+              <a:t> al problema</a:t>
+            </a:r>
+          </a:p>
+        </p:txBody>
+      </p:sp>
+      <p:sp>
+        <p:nvSpPr>
+          <p:cNvPr id="10" name="Rectángulo redondeado 9"/>
+          <p:cNvSpPr/>
+          <p:nvPr/>
+        </p:nvSpPr>
+        <p:spPr>
+          <a:xfrm>
+            <a:off x="3851920" y="5121188"/>
+            <a:ext cx="1368152" cy="648072"/>
+          </a:xfrm>
+          <a:prstGeom prst="roundRect">
+            <a:avLst/>
+          </a:prstGeom>
+          <a:solidFill>
+            <a:schemeClr val="accent1"/>
+          </a:solidFill>
+          <a:ln>
+            <a:solidFill>
+              <a:schemeClr val="tx2"/>
+            </a:solidFill>
+          </a:ln>
+        </p:spPr>
+        <p:style>
+          <a:lnRef idx="2">
+            <a:schemeClr val="accent3">
+              <a:shade val="50000"/>
+            </a:schemeClr>
+          </a:lnRef>
+          <a:fillRef idx="1">
+            <a:schemeClr val="accent3"/>
+          </a:fillRef>
+          <a:effectRef idx="0">
+            <a:schemeClr val="accent3"/>
+          </a:effectRef>
+          <a:fontRef idx="minor">
+            <a:schemeClr val="lt1"/>
+          </a:fontRef>
+        </p:style>
+        <p:txBody>
+          <a:bodyPr rtlCol="0" anchor="ctr"/>
+          <a:lstStyle/>
+          <a:p>
+            <a:pPr algn="ctr"/>
+            <a:r>
+              <a:rPr lang="es-MX" dirty="0"/>
+              <a:t>Juicios y experiencias</a:t>
+            </a:r>
+            <a:endParaRPr lang="es-PE" dirty="0"/>
+          </a:p>
+        </p:txBody>
+      </p:sp>
+      <p:sp>
+        <p:nvSpPr>
+          <p:cNvPr id="11" name="Rectángulo redondeado 10"/>
+          <p:cNvSpPr/>
+          <p:nvPr/>
+        </p:nvSpPr>
+        <p:spPr>
+          <a:xfrm>
+            <a:off x="6660232" y="5121188"/>
+            <a:ext cx="1368152" cy="648072"/>
+          </a:xfrm>
+          <a:prstGeom prst="roundRect">
+            <a:avLst/>
+          </a:prstGeom>
+          <a:solidFill>
+            <a:schemeClr val="bg2">
+              <a:lumMod val="50000"/>
+            </a:schemeClr>
+          </a:solidFill>
+          <a:ln>
+            <a:solidFill>
+              <a:schemeClr val="bg2">
+                <a:lumMod val="10000"/>
+              </a:schemeClr>
+            </a:solidFill>
+          </a:ln>
+        </p:spPr>
+        <p:style>
+          <a:lnRef idx="2">
+            <a:schemeClr val="accent3">
+              <a:shade val="50000"/>
+            </a:schemeClr>
+          </a:lnRef>
+          <a:fillRef idx="1">
+            <a:schemeClr val="accent3"/>
+          </a:fillRef>
+          <a:effectRef idx="0">
+            <a:schemeClr val="accent3"/>
+          </a:effectRef>
+          <a:fontRef idx="minor">
+            <a:schemeClr val="lt1"/>
+          </a:fontRef>
+        </p:style>
+        <p:txBody>
+          <a:bodyPr rtlCol="0" anchor="ctr"/>
+          <a:lstStyle/>
+          <a:p>
+            <a:pPr algn="ctr"/>
+            <a:r>
+              <a:rPr lang="es-MX" dirty="0"/>
+              <a:t>Solución al Modelo</a:t>
+            </a:r>
+            <a:endParaRPr lang="es-PE" dirty="0"/>
+          </a:p>
+        </p:txBody>
+      </p:sp>
+      <p:cxnSp>
+        <p:nvCxnSpPr>
+          <p:cNvPr id="12" name="Conector recto de flecha 11"/>
+          <p:cNvCxnSpPr>
+            <a:stCxn id="7" idx="3"/>
+            <a:endCxn id="6" idx="1"/>
+          </p:cNvCxnSpPr>
+          <p:nvPr/>
+        </p:nvCxnSpPr>
+        <p:spPr>
+          <a:xfrm>
+            <a:off x="2411760" y="3749135"/>
+            <a:ext cx="1440160" cy="0"/>
+          </a:xfrm>
+          <a:prstGeom prst="straightConnector1">
+            <a:avLst/>
+          </a:prstGeom>
+          <a:ln w="28575">
+            <a:tailEnd type="triangle"/>
+          </a:ln>
+        </p:spPr>
+        <p:style>
+          <a:lnRef idx="1">
+            <a:schemeClr val="dk1"/>
+          </a:lnRef>
+          <a:fillRef idx="0">
+            <a:schemeClr val="dk1"/>
+          </a:fillRef>
+          <a:effectRef idx="0">
+            <a:schemeClr val="dk1"/>
+          </a:effectRef>
+          <a:fontRef idx="minor">
+            <a:schemeClr val="tx1"/>
+          </a:fontRef>
+        </p:style>
+      </p:cxnSp>
+      <p:cxnSp>
+        <p:nvCxnSpPr>
+          <p:cNvPr id="14" name="Conector recto de flecha 13"/>
+          <p:cNvCxnSpPr>
+            <a:stCxn id="6" idx="3"/>
+            <a:endCxn id="8" idx="1"/>
+          </p:cNvCxnSpPr>
+          <p:nvPr/>
+        </p:nvCxnSpPr>
+        <p:spPr>
+          <a:xfrm>
+            <a:off x="5220072" y="3749135"/>
+            <a:ext cx="1440160" cy="0"/>
+          </a:xfrm>
+          <a:prstGeom prst="straightConnector1">
+            <a:avLst/>
+          </a:prstGeom>
+          <a:ln w="28575">
+            <a:tailEnd type="triangle"/>
+          </a:ln>
+        </p:spPr>
+        <p:style>
+          <a:lnRef idx="1">
+            <a:schemeClr val="dk1"/>
+          </a:lnRef>
+          <a:fillRef idx="0">
+            <a:schemeClr val="dk1"/>
+          </a:fillRef>
+          <a:effectRef idx="0">
+            <a:schemeClr val="dk1"/>
+          </a:effectRef>
+          <a:fontRef idx="minor">
+            <a:schemeClr val="tx1"/>
+          </a:fontRef>
+        </p:style>
+      </p:cxnSp>
+      <p:sp>
+        <p:nvSpPr>
+          <p:cNvPr id="15" name="CuadroTexto 14"/>
+          <p:cNvSpPr txBox="1"/>
+          <p:nvPr/>
+        </p:nvSpPr>
+        <p:spPr>
+          <a:xfrm>
+            <a:off x="2729742" y="3487525"/>
+            <a:ext cx="804195" cy="523220"/>
+          </a:xfrm>
+          <a:prstGeom prst="rect">
+            <a:avLst/>
+          </a:prstGeom>
+          <a:noFill/>
+        </p:spPr>
+        <p:txBody>
+          <a:bodyPr wrap="none" rtlCol="0">
+            <a:spAutoFit/>
+          </a:bodyPr>
+          <a:lstStyle/>
+          <a:p>
+            <a:pPr algn="ctr"/>
+            <a:r>
+              <a:rPr lang="es-PE" sz="1400" dirty="0"/>
+              <a:t>Variables </a:t>
+            </a:r>
+          </a:p>
+          <a:p>
+            <a:pPr algn="ctr"/>
+            <a:r>
+              <a:rPr lang="es-PE" sz="1400" dirty="0"/>
+              <a:t>relevante</a:t>
+            </a:r>
+          </a:p>
+        </p:txBody>
+      </p:sp>
+      <p:sp>
+        <p:nvSpPr>
+          <p:cNvPr id="16" name="CuadroTexto 15"/>
+          <p:cNvSpPr txBox="1"/>
+          <p:nvPr/>
+        </p:nvSpPr>
+        <p:spPr>
+          <a:xfrm>
+            <a:off x="5482334" y="3487525"/>
+            <a:ext cx="915635" cy="523220"/>
+          </a:xfrm>
+          <a:prstGeom prst="rect">
+            <a:avLst/>
+          </a:prstGeom>
+          <a:noFill/>
+        </p:spPr>
+        <p:txBody>
+          <a:bodyPr wrap="none" rtlCol="0">
+            <a:spAutoFit/>
+          </a:bodyPr>
+          <a:lstStyle/>
+          <a:p>
+            <a:pPr algn="ctr"/>
+            <a:r>
+              <a:rPr lang="es-PE" sz="1400" dirty="0"/>
+              <a:t>Relaciones </a:t>
+            </a:r>
+          </a:p>
+          <a:p>
+            <a:pPr algn="ctr"/>
+            <a:r>
+              <a:rPr lang="es-PE" sz="1400" dirty="0"/>
+              <a:t>relevante</a:t>
+            </a:r>
+          </a:p>
+        </p:txBody>
+      </p:sp>
+      <p:cxnSp>
+        <p:nvCxnSpPr>
+          <p:cNvPr id="18" name="Conector recto de flecha 17"/>
+          <p:cNvCxnSpPr>
+            <a:stCxn id="8" idx="2"/>
+            <a:endCxn id="11" idx="0"/>
+          </p:cNvCxnSpPr>
+          <p:nvPr/>
+        </p:nvCxnSpPr>
+        <p:spPr>
+          <a:xfrm>
+            <a:off x="7344308" y="4073171"/>
+            <a:ext cx="0" cy="1048017"/>
+          </a:xfrm>
+          <a:prstGeom prst="straightConnector1">
+            <a:avLst/>
+          </a:prstGeom>
+          <a:ln w="28575">
+            <a:tailEnd type="triangle"/>
+          </a:ln>
+        </p:spPr>
+        <p:style>
+          <a:lnRef idx="1">
+            <a:schemeClr val="dk1"/>
+          </a:lnRef>
+          <a:fillRef idx="0">
+            <a:schemeClr val="dk1"/>
+          </a:fillRef>
+          <a:effectRef idx="0">
+            <a:schemeClr val="dk1"/>
+          </a:effectRef>
+          <a:fontRef idx="minor">
+            <a:schemeClr val="tx1"/>
+          </a:fontRef>
+        </p:style>
+      </p:cxnSp>
+      <p:cxnSp>
+        <p:nvCxnSpPr>
+          <p:cNvPr id="20" name="Conector recto de flecha 19"/>
+          <p:cNvCxnSpPr>
+            <a:stCxn id="11" idx="1"/>
+            <a:endCxn id="10" idx="3"/>
+          </p:cNvCxnSpPr>
+          <p:nvPr/>
+        </p:nvCxnSpPr>
+        <p:spPr>
+          <a:xfrm flipH="1">
+            <a:off x="5220072" y="5445224"/>
+            <a:ext cx="1440160" cy="0"/>
+          </a:xfrm>
+          <a:prstGeom prst="straightConnector1">
+            <a:avLst/>
+          </a:prstGeom>
+          <a:ln w="28575">
+            <a:tailEnd type="triangle"/>
+          </a:ln>
+        </p:spPr>
+        <p:style>
+          <a:lnRef idx="1">
+            <a:schemeClr val="dk1"/>
+          </a:lnRef>
+          <a:fillRef idx="0">
+            <a:schemeClr val="dk1"/>
+          </a:fillRef>
+          <a:effectRef idx="0">
+            <a:schemeClr val="dk1"/>
+          </a:effectRef>
+          <a:fontRef idx="minor">
+            <a:schemeClr val="tx1"/>
+          </a:fontRef>
+        </p:style>
+      </p:cxnSp>
+      <p:cxnSp>
+        <p:nvCxnSpPr>
+          <p:cNvPr id="22" name="Conector recto de flecha 21"/>
+          <p:cNvCxnSpPr>
+            <a:stCxn id="10" idx="1"/>
+            <a:endCxn id="9" idx="3"/>
+          </p:cNvCxnSpPr>
+          <p:nvPr/>
+        </p:nvCxnSpPr>
+        <p:spPr>
+          <a:xfrm flipH="1">
+            <a:off x="2411760" y="5445224"/>
+            <a:ext cx="1440160" cy="0"/>
+          </a:xfrm>
+          <a:prstGeom prst="straightConnector1">
+            <a:avLst/>
+          </a:prstGeom>
+          <a:ln w="28575">
+            <a:tailEnd type="triangle"/>
+          </a:ln>
+        </p:spPr>
+        <p:style>
+          <a:lnRef idx="1">
+            <a:schemeClr val="dk1"/>
+          </a:lnRef>
+          <a:fillRef idx="0">
+            <a:schemeClr val="dk1"/>
+          </a:fillRef>
+          <a:effectRef idx="0">
+            <a:schemeClr val="dk1"/>
+          </a:effectRef>
+          <a:fontRef idx="minor">
+            <a:schemeClr val="tx1"/>
+          </a:fontRef>
+        </p:style>
+      </p:cxnSp>
+      <p:cxnSp>
+        <p:nvCxnSpPr>
+          <p:cNvPr id="24" name="Conector recto de flecha 23"/>
+          <p:cNvCxnSpPr>
+            <a:stCxn id="9" idx="0"/>
+            <a:endCxn id="7" idx="2"/>
+          </p:cNvCxnSpPr>
+          <p:nvPr/>
+        </p:nvCxnSpPr>
+        <p:spPr>
+          <a:xfrm flipV="1">
+            <a:off x="1691680" y="4109175"/>
+            <a:ext cx="0" cy="976009"/>
+          </a:xfrm>
+          <a:prstGeom prst="straightConnector1">
+            <a:avLst/>
+          </a:prstGeom>
+          <a:ln w="28575">
+            <a:tailEnd type="triangle"/>
+          </a:ln>
+        </p:spPr>
+        <p:style>
+          <a:lnRef idx="1">
+            <a:schemeClr val="dk1"/>
+          </a:lnRef>
+          <a:fillRef idx="0">
+            <a:schemeClr val="dk1"/>
+          </a:fillRef>
+          <a:effectRef idx="0">
+            <a:schemeClr val="dk1"/>
+          </a:effectRef>
+          <a:fontRef idx="minor">
+            <a:schemeClr val="tx1"/>
+          </a:fontRef>
+        </p:style>
+      </p:cxnSp>
+      <p:cxnSp>
+        <p:nvCxnSpPr>
+          <p:cNvPr id="26" name="Conector recto de flecha 25"/>
+          <p:cNvCxnSpPr>
+            <a:stCxn id="10" idx="0"/>
+            <a:endCxn id="6" idx="2"/>
+          </p:cNvCxnSpPr>
+          <p:nvPr/>
+        </p:nvCxnSpPr>
+        <p:spPr>
+          <a:xfrm flipV="1">
+            <a:off x="4535996" y="4073171"/>
+            <a:ext cx="0" cy="1048017"/>
+          </a:xfrm>
+          <a:prstGeom prst="straightConnector1">
+            <a:avLst/>
+          </a:prstGeom>
+          <a:ln w="28575">
+            <a:tailEnd type="triangle"/>
+          </a:ln>
+        </p:spPr>
+        <p:style>
+          <a:lnRef idx="1">
+            <a:schemeClr val="dk1"/>
+          </a:lnRef>
+          <a:fillRef idx="0">
+            <a:schemeClr val="dk1"/>
+          </a:fillRef>
+          <a:effectRef idx="0">
+            <a:schemeClr val="dk1"/>
+          </a:effectRef>
+          <a:fontRef idx="minor">
+            <a:schemeClr val="tx1"/>
+          </a:fontRef>
+        </p:style>
+      </p:cxnSp>
+      <p:sp>
+        <p:nvSpPr>
+          <p:cNvPr id="28" name="CuadroTexto 27"/>
+          <p:cNvSpPr txBox="1"/>
+          <p:nvPr/>
+        </p:nvSpPr>
+        <p:spPr>
+          <a:xfrm rot="5400000">
+            <a:off x="7153249" y="4366347"/>
+            <a:ext cx="814647" cy="461665"/>
+          </a:xfrm>
+          <a:prstGeom prst="rect">
+            <a:avLst/>
+          </a:prstGeom>
+          <a:noFill/>
+        </p:spPr>
+        <p:txBody>
+          <a:bodyPr wrap="none" rtlCol="0">
+            <a:spAutoFit/>
+          </a:bodyPr>
+          <a:lstStyle/>
+          <a:p>
+            <a:pPr algn="ctr"/>
+            <a:r>
+              <a:rPr lang="es-PE" sz="1200" dirty="0"/>
+              <a:t>Método</a:t>
+            </a:r>
+          </a:p>
+          <a:p>
+            <a:pPr algn="ctr"/>
+            <a:r>
+              <a:rPr lang="es-PE" sz="1200" dirty="0"/>
+              <a:t>de solución</a:t>
+            </a:r>
+          </a:p>
+        </p:txBody>
+      </p:sp>
+      <p:sp>
+        <p:nvSpPr>
+          <p:cNvPr id="29" name="CuadroTexto 28"/>
+          <p:cNvSpPr txBox="1"/>
+          <p:nvPr/>
+        </p:nvSpPr>
+        <p:spPr>
+          <a:xfrm>
+            <a:off x="5384426" y="5183614"/>
+            <a:ext cx="1111458" cy="307777"/>
+          </a:xfrm>
+          <a:prstGeom prst="rect">
+            <a:avLst/>
+          </a:prstGeom>
+          <a:noFill/>
+        </p:spPr>
+        <p:txBody>
+          <a:bodyPr wrap="none" rtlCol="0">
+            <a:spAutoFit/>
+          </a:bodyPr>
+          <a:lstStyle/>
+          <a:p>
+            <a:pPr algn="ctr"/>
+            <a:r>
+              <a:rPr lang="es-PE" sz="1400" dirty="0"/>
+              <a:t>Interpretación</a:t>
+            </a:r>
+          </a:p>
+        </p:txBody>
+      </p:sp>
+      <p:sp>
+        <p:nvSpPr>
+          <p:cNvPr id="30" name="CuadroTexto 29"/>
+          <p:cNvSpPr txBox="1"/>
+          <p:nvPr/>
+        </p:nvSpPr>
+        <p:spPr>
+          <a:xfrm>
+            <a:off x="2693257" y="5183614"/>
+            <a:ext cx="877164" cy="307777"/>
+          </a:xfrm>
+          <a:prstGeom prst="rect">
+            <a:avLst/>
+          </a:prstGeom>
+          <a:noFill/>
+        </p:spPr>
+        <p:txBody>
+          <a:bodyPr wrap="none" rtlCol="0">
+            <a:spAutoFit/>
+          </a:bodyPr>
+          <a:lstStyle/>
+          <a:p>
+            <a:pPr algn="ctr"/>
+            <a:r>
+              <a:rPr lang="es-PE" sz="1400" dirty="0"/>
+              <a:t>Decisiones</a:t>
+            </a:r>
+          </a:p>
+        </p:txBody>
+      </p:sp>
+      <p:sp>
+        <p:nvSpPr>
+          <p:cNvPr id="31" name="CuadroTexto 30"/>
+          <p:cNvSpPr txBox="1"/>
+          <p:nvPr/>
+        </p:nvSpPr>
+        <p:spPr>
+          <a:xfrm rot="5400000">
+            <a:off x="1287402" y="4458681"/>
+            <a:ext cx="1085554" cy="276999"/>
+          </a:xfrm>
+          <a:prstGeom prst="rect">
+            <a:avLst/>
+          </a:prstGeom>
+          <a:noFill/>
+        </p:spPr>
+        <p:txBody>
+          <a:bodyPr wrap="none" rtlCol="0">
+            <a:spAutoFit/>
+          </a:bodyPr>
+          <a:lstStyle/>
+          <a:p>
+            <a:pPr algn="ctr"/>
+            <a:r>
+              <a:rPr lang="es-PE" sz="1200" dirty="0"/>
+              <a:t>Implementación</a:t>
+            </a:r>
+          </a:p>
+        </p:txBody>
+      </p:sp>
     </p:spTree>
     <p:extLst>
       <p:ext uri="{BB962C8B-B14F-4D97-AF65-F5344CB8AC3E}">
-        <p14:creationId xmlns:p14="http://schemas.microsoft.com/office/powerpoint/2010/main" val="147473549"/>
+        <p14:creationId xmlns:p14="http://schemas.microsoft.com/office/powerpoint/2010/main" val="1200918865"/>
       </p:ext>
     </p:extLst>
   </p:cSld>

</xml_diff>